<commit_message>
move figures to appendix and update MRS code
</commit_message>
<xml_diff>
--- a/tex/fig/slidesss.pptx
+++ b/tex/fig/slidesss.pptx
@@ -285,7 +285,7 @@
           <a:p>
             <a:fld id="{6875E868-0794-4BDD-BF98-B5ECD2204977}" type="datetimeFigureOut">
               <a:rPr lang="de-DE" smtClean="0"/>
-              <a:t>07.01.2019</a:t>
+              <a:t>08.01.2019</a:t>
             </a:fld>
             <a:endParaRPr lang="de-DE"/>
           </a:p>
@@ -483,7 +483,7 @@
           <a:p>
             <a:fld id="{6875E868-0794-4BDD-BF98-B5ECD2204977}" type="datetimeFigureOut">
               <a:rPr lang="de-DE" smtClean="0"/>
-              <a:t>07.01.2019</a:t>
+              <a:t>08.01.2019</a:t>
             </a:fld>
             <a:endParaRPr lang="de-DE"/>
           </a:p>
@@ -691,7 +691,7 @@
           <a:p>
             <a:fld id="{6875E868-0794-4BDD-BF98-B5ECD2204977}" type="datetimeFigureOut">
               <a:rPr lang="de-DE" smtClean="0"/>
-              <a:t>07.01.2019</a:t>
+              <a:t>08.01.2019</a:t>
             </a:fld>
             <a:endParaRPr lang="de-DE"/>
           </a:p>
@@ -889,7 +889,7 @@
           <a:p>
             <a:fld id="{6875E868-0794-4BDD-BF98-B5ECD2204977}" type="datetimeFigureOut">
               <a:rPr lang="de-DE" smtClean="0"/>
-              <a:t>07.01.2019</a:t>
+              <a:t>08.01.2019</a:t>
             </a:fld>
             <a:endParaRPr lang="de-DE"/>
           </a:p>
@@ -1164,7 +1164,7 @@
           <a:p>
             <a:fld id="{6875E868-0794-4BDD-BF98-B5ECD2204977}" type="datetimeFigureOut">
               <a:rPr lang="de-DE" smtClean="0"/>
-              <a:t>07.01.2019</a:t>
+              <a:t>08.01.2019</a:t>
             </a:fld>
             <a:endParaRPr lang="de-DE"/>
           </a:p>
@@ -1429,7 +1429,7 @@
           <a:p>
             <a:fld id="{6875E868-0794-4BDD-BF98-B5ECD2204977}" type="datetimeFigureOut">
               <a:rPr lang="de-DE" smtClean="0"/>
-              <a:t>07.01.2019</a:t>
+              <a:t>08.01.2019</a:t>
             </a:fld>
             <a:endParaRPr lang="de-DE"/>
           </a:p>
@@ -1841,7 +1841,7 @@
           <a:p>
             <a:fld id="{6875E868-0794-4BDD-BF98-B5ECD2204977}" type="datetimeFigureOut">
               <a:rPr lang="de-DE" smtClean="0"/>
-              <a:t>07.01.2019</a:t>
+              <a:t>08.01.2019</a:t>
             </a:fld>
             <a:endParaRPr lang="de-DE"/>
           </a:p>
@@ -1982,7 +1982,7 @@
           <a:p>
             <a:fld id="{6875E868-0794-4BDD-BF98-B5ECD2204977}" type="datetimeFigureOut">
               <a:rPr lang="de-DE" smtClean="0"/>
-              <a:t>07.01.2019</a:t>
+              <a:t>08.01.2019</a:t>
             </a:fld>
             <a:endParaRPr lang="de-DE"/>
           </a:p>
@@ -2095,7 +2095,7 @@
           <a:p>
             <a:fld id="{6875E868-0794-4BDD-BF98-B5ECD2204977}" type="datetimeFigureOut">
               <a:rPr lang="de-DE" smtClean="0"/>
-              <a:t>07.01.2019</a:t>
+              <a:t>08.01.2019</a:t>
             </a:fld>
             <a:endParaRPr lang="de-DE"/>
           </a:p>
@@ -2406,7 +2406,7 @@
           <a:p>
             <a:fld id="{6875E868-0794-4BDD-BF98-B5ECD2204977}" type="datetimeFigureOut">
               <a:rPr lang="de-DE" smtClean="0"/>
-              <a:t>07.01.2019</a:t>
+              <a:t>08.01.2019</a:t>
             </a:fld>
             <a:endParaRPr lang="de-DE"/>
           </a:p>
@@ -2694,7 +2694,7 @@
           <a:p>
             <a:fld id="{6875E868-0794-4BDD-BF98-B5ECD2204977}" type="datetimeFigureOut">
               <a:rPr lang="de-DE" smtClean="0"/>
-              <a:t>07.01.2019</a:t>
+              <a:t>08.01.2019</a:t>
             </a:fld>
             <a:endParaRPr lang="de-DE"/>
           </a:p>
@@ -2935,7 +2935,7 @@
           <a:p>
             <a:fld id="{6875E868-0794-4BDD-BF98-B5ECD2204977}" type="datetimeFigureOut">
               <a:rPr lang="de-DE" smtClean="0"/>
-              <a:t>07.01.2019</a:t>
+              <a:t>08.01.2019</a:t>
             </a:fld>
             <a:endParaRPr lang="de-DE"/>
           </a:p>
@@ -11084,7 +11084,7 @@
         <p:spPr>
           <a:xfrm>
             <a:off x="992579" y="4122588"/>
-            <a:ext cx="4300023" cy="1200329"/>
+            <a:ext cx="4212885" cy="1200329"/>
           </a:xfrm>
           <a:prstGeom prst="rect">
             <a:avLst/>
@@ -11113,7 +11113,7 @@
           <a:p>
             <a:r>
               <a:rPr lang="de-DE" dirty="0"/>
-              <a:t>True Negatives are removed from Result Set</a:t>
+              <a:t>True negatives are removed from result set</a:t>
             </a:r>
           </a:p>
         </p:txBody>
@@ -11977,7 +11977,7 @@
         <p:spPr>
           <a:xfrm>
             <a:off x="6096000" y="4122588"/>
-            <a:ext cx="4300023" cy="1200329"/>
+            <a:ext cx="4212885" cy="1200329"/>
           </a:xfrm>
           <a:prstGeom prst="rect">
             <a:avLst/>
@@ -12006,7 +12006,7 @@
           <a:p>
             <a:r>
               <a:rPr lang="de-DE" dirty="0"/>
-              <a:t>True Negatives are removed from Result Set</a:t>
+              <a:t>True negatives are removed from result set</a:t>
             </a:r>
           </a:p>
         </p:txBody>
@@ -13622,24 +13622,6 @@
                       </a:rPr>
                       <m:t> </m:t>
                     </m:r>
-                    <m:r>
-                      <a:rPr lang="de-DE" dirty="0" smtClean="0">
-                        <a:solidFill>
-                          <a:schemeClr val="tx1"/>
-                        </a:solidFill>
-                        <a:latin typeface="Cambria Math" panose="02040503050406030204" pitchFamily="18" charset="0"/>
-                      </a:rPr>
-                      <m:t>+</m:t>
-                    </m:r>
-                    <m:r>
-                      <a:rPr lang="de-DE" i="1" dirty="0" smtClean="0">
-                        <a:solidFill>
-                          <a:schemeClr val="tx1"/>
-                        </a:solidFill>
-                        <a:latin typeface="Cambria Math" panose="02040503050406030204" pitchFamily="18" charset="0"/>
-                      </a:rPr>
-                      <m:t>𝑐</m:t>
-                    </m:r>
                   </m:oMath>
                 </a14:m>
                 <a:r>
@@ -14012,8 +13994,8 @@
             </p:nvSpPr>
             <p:spPr>
               <a:xfrm>
-                <a:off x="6486052" y="4541580"/>
-                <a:ext cx="1182848" cy="436690"/>
+                <a:off x="6358251" y="4541580"/>
+                <a:ext cx="1446499" cy="436690"/>
               </a:xfrm>
               <a:prstGeom prst="rect">
                 <a:avLst/>
@@ -14091,6 +14073,33 @@
                       </a:rPr>
                       <m:t> </m:t>
                     </m:r>
+                    <m:r>
+                      <a:rPr lang="de-DE" b="0" i="1" dirty="0" smtClean="0">
+                        <a:solidFill>
+                          <a:schemeClr val="tx1"/>
+                        </a:solidFill>
+                        <a:latin typeface="Cambria Math" panose="02040503050406030204" pitchFamily="18" charset="0"/>
+                      </a:rPr>
+                      <m:t>−</m:t>
+                    </m:r>
+                    <m:r>
+                      <a:rPr lang="de-DE" b="0" i="1" dirty="0" smtClean="0">
+                        <a:solidFill>
+                          <a:schemeClr val="tx1"/>
+                        </a:solidFill>
+                        <a:latin typeface="Cambria Math" panose="02040503050406030204" pitchFamily="18" charset="0"/>
+                      </a:rPr>
+                      <m:t>𝑑</m:t>
+                    </m:r>
+                    <m:r>
+                      <a:rPr lang="de-DE" b="0" i="1" dirty="0" smtClean="0">
+                        <a:solidFill>
+                          <a:schemeClr val="tx1"/>
+                        </a:solidFill>
+                        <a:latin typeface="Cambria Math" panose="02040503050406030204" pitchFamily="18" charset="0"/>
+                      </a:rPr>
+                      <m:t> </m:t>
+                    </m:r>
                   </m:oMath>
                 </a14:m>
                 <a:r>
@@ -14127,8 +14136,8 @@
             </p:nvSpPr>
             <p:spPr>
               <a:xfrm>
-                <a:off x="6486052" y="4541580"/>
-                <a:ext cx="1182848" cy="436690"/>
+                <a:off x="6358251" y="4541580"/>
+                <a:ext cx="1446499" cy="436690"/>
               </a:xfrm>
               <a:prstGeom prst="rect">
                 <a:avLst/>
@@ -14368,9 +14377,9 @@
           <p:nvPr/>
         </p:nvCxnSpPr>
         <p:spPr>
-          <a:xfrm flipH="1">
-            <a:off x="7077476" y="3744943"/>
-            <a:ext cx="1" cy="796637"/>
+          <a:xfrm>
+            <a:off x="7077477" y="3744943"/>
+            <a:ext cx="4024" cy="796637"/>
           </a:xfrm>
           <a:prstGeom prst="line">
             <a:avLst/>
@@ -15576,10 +15585,13 @@
                         <m:t>−</m:t>
                       </m:r>
                       <m:r>
-                        <a:rPr lang="de-DE" i="1" dirty="0">
+                        <m:rPr>
+                          <m:sty m:val="p"/>
+                        </m:rPr>
+                        <a:rPr lang="de-DE" b="0" i="0" dirty="0" smtClean="0">
                           <a:latin typeface="Cambria Math" panose="02040503050406030204" pitchFamily="18" charset="0"/>
                         </a:rPr>
-                        <m:t>𝑐</m:t>
+                        <m:t>d</m:t>
                       </m:r>
                     </m:oMath>
                   </m:oMathPara>
@@ -15620,7 +15632,7 @@
               <a:blipFill>
                 <a:blip r:embed="rId12"/>
                 <a:stretch>
-                  <a:fillRect r="-4478"/>
+                  <a:fillRect r="-16418"/>
                 </a:stretch>
               </a:blipFill>
             </p:spPr>

</xml_diff>